<commit_message>
Description added for UtilImage
</commit_message>
<xml_diff>
--- a/Description/Utils.pptx
+++ b/Description/Utils.pptx
@@ -272,7 +272,7 @@
           <a:p>
             <a:fld id="{DDCE6D58-9B57-4731-A47B-3CD41B48F0A9}" type="datetimeFigureOut">
               <a:rPr lang="de-CH" smtClean="0"/>
-              <a:t>05.04.2025</a:t>
+              <a:t>06.04.2025</a:t>
             </a:fld>
             <a:endParaRPr lang="de-CH"/>
           </a:p>
@@ -442,7 +442,7 @@
           <a:p>
             <a:fld id="{DDCE6D58-9B57-4731-A47B-3CD41B48F0A9}" type="datetimeFigureOut">
               <a:rPr lang="de-CH" smtClean="0"/>
-              <a:t>05.04.2025</a:t>
+              <a:t>06.04.2025</a:t>
             </a:fld>
             <a:endParaRPr lang="de-CH"/>
           </a:p>
@@ -622,7 +622,7 @@
           <a:p>
             <a:fld id="{DDCE6D58-9B57-4731-A47B-3CD41B48F0A9}" type="datetimeFigureOut">
               <a:rPr lang="de-CH" smtClean="0"/>
-              <a:t>05.04.2025</a:t>
+              <a:t>06.04.2025</a:t>
             </a:fld>
             <a:endParaRPr lang="de-CH"/>
           </a:p>
@@ -792,7 +792,7 @@
           <a:p>
             <a:fld id="{DDCE6D58-9B57-4731-A47B-3CD41B48F0A9}" type="datetimeFigureOut">
               <a:rPr lang="de-CH" smtClean="0"/>
-              <a:t>05.04.2025</a:t>
+              <a:t>06.04.2025</a:t>
             </a:fld>
             <a:endParaRPr lang="de-CH"/>
           </a:p>
@@ -1038,7 +1038,7 @@
           <a:p>
             <a:fld id="{DDCE6D58-9B57-4731-A47B-3CD41B48F0A9}" type="datetimeFigureOut">
               <a:rPr lang="de-CH" smtClean="0"/>
-              <a:t>05.04.2025</a:t>
+              <a:t>06.04.2025</a:t>
             </a:fld>
             <a:endParaRPr lang="de-CH"/>
           </a:p>
@@ -1270,7 +1270,7 @@
           <a:p>
             <a:fld id="{DDCE6D58-9B57-4731-A47B-3CD41B48F0A9}" type="datetimeFigureOut">
               <a:rPr lang="de-CH" smtClean="0"/>
-              <a:t>05.04.2025</a:t>
+              <a:t>06.04.2025</a:t>
             </a:fld>
             <a:endParaRPr lang="de-CH"/>
           </a:p>
@@ -1637,7 +1637,7 @@
           <a:p>
             <a:fld id="{DDCE6D58-9B57-4731-A47B-3CD41B48F0A9}" type="datetimeFigureOut">
               <a:rPr lang="de-CH" smtClean="0"/>
-              <a:t>05.04.2025</a:t>
+              <a:t>06.04.2025</a:t>
             </a:fld>
             <a:endParaRPr lang="de-CH"/>
           </a:p>
@@ -1755,7 +1755,7 @@
           <a:p>
             <a:fld id="{DDCE6D58-9B57-4731-A47B-3CD41B48F0A9}" type="datetimeFigureOut">
               <a:rPr lang="de-CH" smtClean="0"/>
-              <a:t>05.04.2025</a:t>
+              <a:t>06.04.2025</a:t>
             </a:fld>
             <a:endParaRPr lang="de-CH"/>
           </a:p>
@@ -1850,7 +1850,7 @@
           <a:p>
             <a:fld id="{DDCE6D58-9B57-4731-A47B-3CD41B48F0A9}" type="datetimeFigureOut">
               <a:rPr lang="de-CH" smtClean="0"/>
-              <a:t>05.04.2025</a:t>
+              <a:t>06.04.2025</a:t>
             </a:fld>
             <a:endParaRPr lang="de-CH"/>
           </a:p>
@@ -2127,7 +2127,7 @@
           <a:p>
             <a:fld id="{DDCE6D58-9B57-4731-A47B-3CD41B48F0A9}" type="datetimeFigureOut">
               <a:rPr lang="de-CH" smtClean="0"/>
-              <a:t>05.04.2025</a:t>
+              <a:t>06.04.2025</a:t>
             </a:fld>
             <a:endParaRPr lang="de-CH"/>
           </a:p>
@@ -2380,7 +2380,7 @@
           <a:p>
             <a:fld id="{DDCE6D58-9B57-4731-A47B-3CD41B48F0A9}" type="datetimeFigureOut">
               <a:rPr lang="de-CH" smtClean="0"/>
-              <a:t>05.04.2025</a:t>
+              <a:t>06.04.2025</a:t>
             </a:fld>
             <a:endParaRPr lang="de-CH"/>
           </a:p>
@@ -2593,7 +2593,7 @@
           <a:p>
             <a:fld id="{DDCE6D58-9B57-4731-A47B-3CD41B48F0A9}" type="datetimeFigureOut">
               <a:rPr lang="de-CH" smtClean="0"/>
-              <a:t>05.04.2025</a:t>
+              <a:t>06.04.2025</a:t>
             </a:fld>
             <a:endParaRPr lang="de-CH"/>
           </a:p>
@@ -4844,8 +4844,8 @@
         </p:nvSpPr>
         <p:spPr>
           <a:xfrm>
-            <a:off x="175847" y="146764"/>
-            <a:ext cx="4126522" cy="570469"/>
+            <a:off x="175848" y="146764"/>
+            <a:ext cx="3411414" cy="570469"/>
           </a:xfrm>
           <a:prstGeom prst="rect">
             <a:avLst/>
@@ -4906,7 +4906,7 @@
                 <a:latin typeface="Arial" panose="020B0604020202020204" pitchFamily="34" charset="0"/>
                 <a:cs typeface="Arial" panose="020B0604020202020204" pitchFamily="34" charset="0"/>
               </a:rPr>
-              <a:t>Scaling</a:t>
+              <a:t>Scalie</a:t>
             </a:r>
             <a:r>
               <a:rPr lang="de-CH" sz="1200" dirty="0">
@@ -4926,27 +4926,7 @@
                 <a:latin typeface="Arial" panose="020B0604020202020204" pitchFamily="34" charset="0"/>
                 <a:cs typeface="Arial" panose="020B0604020202020204" pitchFamily="34" charset="0"/>
               </a:rPr>
-              <a:t>positioning</a:t>
-            </a:r>
-            <a:r>
-              <a:rPr lang="de-CH" sz="1200" dirty="0">
-                <a:solidFill>
-                  <a:schemeClr val="tx1"/>
-                </a:solidFill>
-                <a:latin typeface="Arial" panose="020B0604020202020204" pitchFamily="34" charset="0"/>
-                <a:cs typeface="Arial" panose="020B0604020202020204" pitchFamily="34" charset="0"/>
-              </a:rPr>
-              <a:t> </a:t>
-            </a:r>
-            <a:r>
-              <a:rPr lang="de-CH" sz="1200" dirty="0" err="1">
-                <a:solidFill>
-                  <a:schemeClr val="tx1"/>
-                </a:solidFill>
-                <a:latin typeface="Arial" panose="020B0604020202020204" pitchFamily="34" charset="0"/>
-                <a:cs typeface="Arial" panose="020B0604020202020204" pitchFamily="34" charset="0"/>
-              </a:rPr>
-              <a:t>of</a:t>
+              <a:t>position</a:t>
             </a:r>
             <a:r>
               <a:rPr lang="de-CH" sz="1200" dirty="0">
@@ -5012,8 +4992,8 @@
         </p:nvSpPr>
         <p:spPr>
           <a:xfrm>
-            <a:off x="175844" y="717233"/>
-            <a:ext cx="4126525" cy="2711767"/>
+            <a:off x="175846" y="717233"/>
+            <a:ext cx="3411414" cy="3407397"/>
           </a:xfrm>
           <a:prstGeom prst="rect">
             <a:avLst/>
@@ -5254,6 +5234,941 @@
                 <a:cs typeface="Arial" panose="020B0604020202020204" pitchFamily="34" charset="0"/>
               </a:rPr>
               <a:t>Returns the scale factor for an image that makes it fit to a given div element</a:t>
+            </a:r>
+          </a:p>
+          <a:p>
+            <a:endParaRPr lang="en-US" sz="1000" i="1" dirty="0">
+              <a:solidFill>
+                <a:schemeClr val="tx1"/>
+              </a:solidFill>
+              <a:latin typeface="Arial" panose="020B0604020202020204" pitchFamily="34" charset="0"/>
+              <a:cs typeface="Arial" panose="020B0604020202020204" pitchFamily="34" charset="0"/>
+            </a:endParaRPr>
+          </a:p>
+          <a:p>
+            <a:r>
+              <a:rPr lang="en-US" sz="1000" b="1" dirty="0" err="1">
+                <a:solidFill>
+                  <a:schemeClr val="tx1"/>
+                </a:solidFill>
+                <a:latin typeface="Arial" panose="020B0604020202020204" pitchFamily="34" charset="0"/>
+                <a:cs typeface="Arial" panose="020B0604020202020204" pitchFamily="34" charset="0"/>
+              </a:rPr>
+              <a:t>imageNotFound</a:t>
+            </a:r>
+            <a:endParaRPr lang="en-US" sz="1000" b="1" dirty="0">
+              <a:solidFill>
+                <a:schemeClr val="tx1"/>
+              </a:solidFill>
+              <a:latin typeface="Arial" panose="020B0604020202020204" pitchFamily="34" charset="0"/>
+              <a:cs typeface="Arial" panose="020B0604020202020204" pitchFamily="34" charset="0"/>
+            </a:endParaRPr>
+          </a:p>
+          <a:p>
+            <a:r>
+              <a:rPr lang="en-US" sz="1000" b="1" i="1" dirty="0">
+                <a:solidFill>
+                  <a:schemeClr val="tx1"/>
+                </a:solidFill>
+                <a:latin typeface="Arial" panose="020B0604020202020204" pitchFamily="34" charset="0"/>
+                <a:cs typeface="Arial" panose="020B0604020202020204" pitchFamily="34" charset="0"/>
+              </a:rPr>
+              <a:t>Error message image not found</a:t>
+            </a:r>
+          </a:p>
+          <a:p>
+            <a:endParaRPr lang="en-US" sz="1000" i="1" dirty="0">
+              <a:solidFill>
+                <a:schemeClr val="tx1"/>
+              </a:solidFill>
+              <a:latin typeface="Arial" panose="020B0604020202020204" pitchFamily="34" charset="0"/>
+              <a:cs typeface="Arial" panose="020B0604020202020204" pitchFamily="34" charset="0"/>
+            </a:endParaRPr>
+          </a:p>
+        </p:txBody>
+      </p:sp>
+      <p:sp>
+        <p:nvSpPr>
+          <p:cNvPr id="4" name="Rechteck 3">
+            <a:extLst>
+              <a:ext uri="{FF2B5EF4-FFF2-40B4-BE49-F238E27FC236}">
+                <a16:creationId xmlns:a16="http://schemas.microsoft.com/office/drawing/2014/main" id="{3393A316-84C9-D3D2-15F3-B6CBB91B4791}"/>
+              </a:ext>
+            </a:extLst>
+          </p:cNvPr>
+          <p:cNvSpPr/>
+          <p:nvPr/>
+        </p:nvSpPr>
+        <p:spPr>
+          <a:xfrm>
+            <a:off x="3671722" y="146763"/>
+            <a:ext cx="4663387" cy="4003205"/>
+          </a:xfrm>
+          <a:prstGeom prst="rect">
+            <a:avLst/>
+          </a:prstGeom>
+          <a:noFill/>
+          <a:ln w="19050">
+            <a:solidFill>
+              <a:schemeClr val="tx1"/>
+            </a:solidFill>
+            <a:prstDash val="dash"/>
+          </a:ln>
+        </p:spPr>
+        <p:style>
+          <a:lnRef idx="2">
+            <a:schemeClr val="accent1">
+              <a:shade val="50000"/>
+            </a:schemeClr>
+          </a:lnRef>
+          <a:fillRef idx="1">
+            <a:schemeClr val="accent1"/>
+          </a:fillRef>
+          <a:effectRef idx="0">
+            <a:schemeClr val="accent1"/>
+          </a:effectRef>
+          <a:fontRef idx="minor">
+            <a:schemeClr val="lt1"/>
+          </a:fontRef>
+        </p:style>
+        <p:txBody>
+          <a:bodyPr rtlCol="0" anchor="ctr"/>
+          <a:lstStyle/>
+          <a:p>
+            <a:r>
+              <a:rPr lang="en-US" sz="1000" i="1" dirty="0">
+                <a:solidFill>
+                  <a:schemeClr val="tx1"/>
+                </a:solidFill>
+                <a:latin typeface="Arial" panose="020B0604020202020204" pitchFamily="34" charset="0"/>
+                <a:cs typeface="Arial" panose="020B0604020202020204" pitchFamily="34" charset="0"/>
+              </a:rPr>
+              <a:t>// Define two event functions before setting source for the new image</a:t>
+            </a:r>
+          </a:p>
+          <a:p>
+            <a:r>
+              <a:rPr lang="en-US" sz="1000" b="1" dirty="0">
+                <a:solidFill>
+                  <a:schemeClr val="tx1"/>
+                </a:solidFill>
+                <a:latin typeface="Arial" panose="020B0604020202020204" pitchFamily="34" charset="0"/>
+                <a:cs typeface="Arial" panose="020B0604020202020204" pitchFamily="34" charset="0"/>
+              </a:rPr>
+              <a:t>static </a:t>
+            </a:r>
+            <a:r>
+              <a:rPr lang="en-US" sz="1000" b="1" dirty="0" err="1">
+                <a:solidFill>
+                  <a:schemeClr val="tx1"/>
+                </a:solidFill>
+                <a:latin typeface="Arial" panose="020B0604020202020204" pitchFamily="34" charset="0"/>
+                <a:cs typeface="Arial" panose="020B0604020202020204" pitchFamily="34" charset="0"/>
+              </a:rPr>
+              <a:t>replaceImageInDivContainer</a:t>
+            </a:r>
+            <a:r>
+              <a:rPr lang="en-US" sz="1000" b="1" dirty="0">
+                <a:solidFill>
+                  <a:schemeClr val="tx1"/>
+                </a:solidFill>
+                <a:latin typeface="Arial" panose="020B0604020202020204" pitchFamily="34" charset="0"/>
+                <a:cs typeface="Arial" panose="020B0604020202020204" pitchFamily="34" charset="0"/>
+              </a:rPr>
+              <a:t>(</a:t>
+            </a:r>
+            <a:r>
+              <a:rPr lang="en-US" sz="1000" b="1" dirty="0" err="1">
+                <a:solidFill>
+                  <a:schemeClr val="tx1"/>
+                </a:solidFill>
+                <a:latin typeface="Arial" panose="020B0604020202020204" pitchFamily="34" charset="0"/>
+                <a:cs typeface="Arial" panose="020B0604020202020204" pitchFamily="34" charset="0"/>
+              </a:rPr>
+              <a:t>i_image</a:t>
+            </a:r>
+            <a:r>
+              <a:rPr lang="en-US" sz="1000" b="1" dirty="0">
+                <a:solidFill>
+                  <a:schemeClr val="tx1"/>
+                </a:solidFill>
+                <a:latin typeface="Arial" panose="020B0604020202020204" pitchFamily="34" charset="0"/>
+                <a:cs typeface="Arial" panose="020B0604020202020204" pitchFamily="34" charset="0"/>
+              </a:rPr>
+              <a:t>, </a:t>
+            </a:r>
+            <a:r>
+              <a:rPr lang="en-US" sz="1000" b="1" dirty="0" err="1">
+                <a:solidFill>
+                  <a:schemeClr val="tx1"/>
+                </a:solidFill>
+                <a:latin typeface="Arial" panose="020B0604020202020204" pitchFamily="34" charset="0"/>
+                <a:cs typeface="Arial" panose="020B0604020202020204" pitchFamily="34" charset="0"/>
+              </a:rPr>
+              <a:t>i_el_div</a:t>
+            </a:r>
+            <a:r>
+              <a:rPr lang="en-US" sz="1000" b="1" dirty="0">
+                <a:solidFill>
+                  <a:schemeClr val="tx1"/>
+                </a:solidFill>
+                <a:latin typeface="Arial" panose="020B0604020202020204" pitchFamily="34" charset="0"/>
+                <a:cs typeface="Arial" panose="020B0604020202020204" pitchFamily="34" charset="0"/>
+              </a:rPr>
+              <a:t>)</a:t>
+            </a:r>
+          </a:p>
+          <a:p>
+            <a:r>
+              <a:rPr lang="en-US" sz="1000" b="1" dirty="0">
+                <a:solidFill>
+                  <a:schemeClr val="tx1"/>
+                </a:solidFill>
+                <a:latin typeface="Arial" panose="020B0604020202020204" pitchFamily="34" charset="0"/>
+                <a:cs typeface="Arial" panose="020B0604020202020204" pitchFamily="34" charset="0"/>
+              </a:rPr>
+              <a:t>{</a:t>
+            </a:r>
+          </a:p>
+          <a:p>
+            <a:r>
+              <a:rPr lang="en-US" sz="1000" b="1" dirty="0">
+                <a:solidFill>
+                  <a:schemeClr val="tx1"/>
+                </a:solidFill>
+                <a:latin typeface="Arial" panose="020B0604020202020204" pitchFamily="34" charset="0"/>
+                <a:cs typeface="Arial" panose="020B0604020202020204" pitchFamily="34" charset="0"/>
+              </a:rPr>
+              <a:t>    var </a:t>
+            </a:r>
+            <a:r>
+              <a:rPr lang="en-US" sz="1000" b="1" dirty="0" err="1">
+                <a:solidFill>
+                  <a:schemeClr val="tx1"/>
+                </a:solidFill>
+                <a:latin typeface="Arial" panose="020B0604020202020204" pitchFamily="34" charset="0"/>
+                <a:cs typeface="Arial" panose="020B0604020202020204" pitchFamily="34" charset="0"/>
+              </a:rPr>
+              <a:t>el_image</a:t>
+            </a:r>
+            <a:r>
+              <a:rPr lang="en-US" sz="1000" b="1" dirty="0">
+                <a:solidFill>
+                  <a:schemeClr val="tx1"/>
+                </a:solidFill>
+                <a:latin typeface="Arial" panose="020B0604020202020204" pitchFamily="34" charset="0"/>
+                <a:cs typeface="Arial" panose="020B0604020202020204" pitchFamily="34" charset="0"/>
+              </a:rPr>
+              <a:t> = new Image();</a:t>
+            </a:r>
+          </a:p>
+          <a:p>
+            <a:endParaRPr lang="en-US" sz="200" b="1" dirty="0">
+              <a:solidFill>
+                <a:schemeClr val="tx1"/>
+              </a:solidFill>
+              <a:latin typeface="Arial" panose="020B0604020202020204" pitchFamily="34" charset="0"/>
+              <a:cs typeface="Arial" panose="020B0604020202020204" pitchFamily="34" charset="0"/>
+            </a:endParaRPr>
+          </a:p>
+          <a:p>
+            <a:r>
+              <a:rPr lang="en-US" sz="1000" b="1" dirty="0">
+                <a:solidFill>
+                  <a:schemeClr val="tx1"/>
+                </a:solidFill>
+                <a:latin typeface="Arial" panose="020B0604020202020204" pitchFamily="34" charset="0"/>
+                <a:cs typeface="Arial" panose="020B0604020202020204" pitchFamily="34" charset="0"/>
+              </a:rPr>
+              <a:t>    var </a:t>
+            </a:r>
+            <a:r>
+              <a:rPr lang="en-US" sz="1000" b="1" dirty="0" err="1">
+                <a:solidFill>
+                  <a:schemeClr val="tx1"/>
+                </a:solidFill>
+                <a:latin typeface="Arial" panose="020B0604020202020204" pitchFamily="34" charset="0"/>
+                <a:cs typeface="Arial" panose="020B0604020202020204" pitchFamily="34" charset="0"/>
+              </a:rPr>
+              <a:t>el_image</a:t>
+            </a:r>
+            <a:r>
+              <a:rPr lang="en-US" sz="1000" b="1" dirty="0">
+                <a:solidFill>
+                  <a:schemeClr val="tx1"/>
+                </a:solidFill>
+                <a:latin typeface="Arial" panose="020B0604020202020204" pitchFamily="34" charset="0"/>
+                <a:cs typeface="Arial" panose="020B0604020202020204" pitchFamily="34" charset="0"/>
+              </a:rPr>
+              <a:t> = </a:t>
+            </a:r>
+            <a:r>
+              <a:rPr lang="en-US" sz="1000" b="1" dirty="0" err="1">
+                <a:solidFill>
+                  <a:schemeClr val="tx1"/>
+                </a:solidFill>
+                <a:latin typeface="Arial" panose="020B0604020202020204" pitchFamily="34" charset="0"/>
+                <a:cs typeface="Arial" panose="020B0604020202020204" pitchFamily="34" charset="0"/>
+              </a:rPr>
+              <a:t>UtilImage.getImageElement</a:t>
+            </a:r>
+            <a:r>
+              <a:rPr lang="en-US" sz="1000" b="1" dirty="0">
+                <a:solidFill>
+                  <a:schemeClr val="tx1"/>
+                </a:solidFill>
+                <a:latin typeface="Arial" panose="020B0604020202020204" pitchFamily="34" charset="0"/>
+                <a:cs typeface="Arial" panose="020B0604020202020204" pitchFamily="34" charset="0"/>
+              </a:rPr>
+              <a:t>(</a:t>
+            </a:r>
+            <a:r>
+              <a:rPr lang="en-US" sz="1000" b="1" dirty="0" err="1">
+                <a:solidFill>
+                  <a:schemeClr val="tx1"/>
+                </a:solidFill>
+                <a:latin typeface="Arial" panose="020B0604020202020204" pitchFamily="34" charset="0"/>
+                <a:cs typeface="Arial" panose="020B0604020202020204" pitchFamily="34" charset="0"/>
+              </a:rPr>
+              <a:t>i_el_div</a:t>
+            </a:r>
+            <a:r>
+              <a:rPr lang="en-US" sz="1000" b="1" dirty="0">
+                <a:solidFill>
+                  <a:schemeClr val="tx1"/>
+                </a:solidFill>
+                <a:latin typeface="Arial" panose="020B0604020202020204" pitchFamily="34" charset="0"/>
+                <a:cs typeface="Arial" panose="020B0604020202020204" pitchFamily="34" charset="0"/>
+              </a:rPr>
+              <a:t>);</a:t>
+            </a:r>
+          </a:p>
+          <a:p>
+            <a:endParaRPr lang="en-US" sz="200" b="1" dirty="0">
+              <a:solidFill>
+                <a:schemeClr val="tx1"/>
+              </a:solidFill>
+              <a:latin typeface="Arial" panose="020B0604020202020204" pitchFamily="34" charset="0"/>
+              <a:cs typeface="Arial" panose="020B0604020202020204" pitchFamily="34" charset="0"/>
+            </a:endParaRPr>
+          </a:p>
+          <a:p>
+            <a:r>
+              <a:rPr lang="en-US" sz="1000" b="1" dirty="0">
+                <a:solidFill>
+                  <a:schemeClr val="tx1"/>
+                </a:solidFill>
+                <a:latin typeface="Arial" panose="020B0604020202020204" pitchFamily="34" charset="0"/>
+                <a:cs typeface="Arial" panose="020B0604020202020204" pitchFamily="34" charset="0"/>
+              </a:rPr>
+              <a:t>    </a:t>
+            </a:r>
+            <a:r>
+              <a:rPr lang="en-US" sz="1000" b="1" dirty="0" err="1">
+                <a:solidFill>
+                  <a:schemeClr val="tx1"/>
+                </a:solidFill>
+                <a:latin typeface="Arial" panose="020B0604020202020204" pitchFamily="34" charset="0"/>
+                <a:cs typeface="Arial" panose="020B0604020202020204" pitchFamily="34" charset="0"/>
+              </a:rPr>
+              <a:t>el_image.onload</a:t>
+            </a:r>
+            <a:r>
+              <a:rPr lang="en-US" sz="1000" b="1" dirty="0">
+                <a:solidFill>
+                  <a:schemeClr val="tx1"/>
+                </a:solidFill>
+                <a:latin typeface="Arial" panose="020B0604020202020204" pitchFamily="34" charset="0"/>
+                <a:cs typeface="Arial" panose="020B0604020202020204" pitchFamily="34" charset="0"/>
+              </a:rPr>
+              <a:t> = function () </a:t>
+            </a:r>
+          </a:p>
+          <a:p>
+            <a:r>
+              <a:rPr lang="en-US" sz="1000" b="1" dirty="0">
+                <a:solidFill>
+                  <a:schemeClr val="tx1"/>
+                </a:solidFill>
+                <a:latin typeface="Arial" panose="020B0604020202020204" pitchFamily="34" charset="0"/>
+                <a:cs typeface="Arial" panose="020B0604020202020204" pitchFamily="34" charset="0"/>
+              </a:rPr>
+              <a:t>     {</a:t>
+            </a:r>
+          </a:p>
+          <a:p>
+            <a:r>
+              <a:rPr lang="en-US" sz="1000" b="1" dirty="0">
+                <a:solidFill>
+                  <a:schemeClr val="tx1"/>
+                </a:solidFill>
+                <a:latin typeface="Arial" panose="020B0604020202020204" pitchFamily="34" charset="0"/>
+                <a:cs typeface="Arial" panose="020B0604020202020204" pitchFamily="34" charset="0"/>
+              </a:rPr>
+              <a:t>         </a:t>
+            </a:r>
+            <a:r>
+              <a:rPr lang="en-US" sz="1000" b="1" dirty="0" err="1">
+                <a:solidFill>
+                  <a:schemeClr val="tx1"/>
+                </a:solidFill>
+                <a:latin typeface="Arial" panose="020B0604020202020204" pitchFamily="34" charset="0"/>
+                <a:cs typeface="Arial" panose="020B0604020202020204" pitchFamily="34" charset="0"/>
+              </a:rPr>
+              <a:t>UtilImage.replaceImageInDivContainerAfterLoad</a:t>
+            </a:r>
+            <a:endParaRPr lang="en-US" sz="1000" b="1" dirty="0">
+              <a:solidFill>
+                <a:schemeClr val="tx1"/>
+              </a:solidFill>
+              <a:latin typeface="Arial" panose="020B0604020202020204" pitchFamily="34" charset="0"/>
+              <a:cs typeface="Arial" panose="020B0604020202020204" pitchFamily="34" charset="0"/>
+            </a:endParaRPr>
+          </a:p>
+          <a:p>
+            <a:r>
+              <a:rPr lang="en-US" sz="1000" b="1" dirty="0">
+                <a:solidFill>
+                  <a:schemeClr val="tx1"/>
+                </a:solidFill>
+                <a:latin typeface="Arial" panose="020B0604020202020204" pitchFamily="34" charset="0"/>
+                <a:cs typeface="Arial" panose="020B0604020202020204" pitchFamily="34" charset="0"/>
+              </a:rPr>
+              <a:t>                                 (</a:t>
+            </a:r>
+            <a:r>
+              <a:rPr lang="en-US" sz="1000" b="1" dirty="0" err="1">
+                <a:solidFill>
+                  <a:schemeClr val="tx1"/>
+                </a:solidFill>
+                <a:latin typeface="Arial" panose="020B0604020202020204" pitchFamily="34" charset="0"/>
+                <a:cs typeface="Arial" panose="020B0604020202020204" pitchFamily="34" charset="0"/>
+              </a:rPr>
+              <a:t>el_image</a:t>
+            </a:r>
+            <a:r>
+              <a:rPr lang="en-US" sz="1000" b="1" dirty="0">
+                <a:solidFill>
+                  <a:schemeClr val="tx1"/>
+                </a:solidFill>
+                <a:latin typeface="Arial" panose="020B0604020202020204" pitchFamily="34" charset="0"/>
+                <a:cs typeface="Arial" panose="020B0604020202020204" pitchFamily="34" charset="0"/>
+              </a:rPr>
+              <a:t>, </a:t>
+            </a:r>
+            <a:r>
+              <a:rPr lang="en-US" sz="1000" b="1" dirty="0" err="1">
+                <a:solidFill>
+                  <a:schemeClr val="tx1"/>
+                </a:solidFill>
+                <a:latin typeface="Arial" panose="020B0604020202020204" pitchFamily="34" charset="0"/>
+                <a:cs typeface="Arial" panose="020B0604020202020204" pitchFamily="34" charset="0"/>
+              </a:rPr>
+              <a:t>el_image</a:t>
+            </a:r>
+            <a:r>
+              <a:rPr lang="en-US" sz="1000" b="1" dirty="0">
+                <a:solidFill>
+                  <a:schemeClr val="tx1"/>
+                </a:solidFill>
+                <a:latin typeface="Arial" panose="020B0604020202020204" pitchFamily="34" charset="0"/>
+                <a:cs typeface="Arial" panose="020B0604020202020204" pitchFamily="34" charset="0"/>
+              </a:rPr>
+              <a:t>, </a:t>
+            </a:r>
+            <a:r>
+              <a:rPr lang="en-US" sz="1000" b="1" dirty="0" err="1">
+                <a:solidFill>
+                  <a:schemeClr val="tx1"/>
+                </a:solidFill>
+                <a:latin typeface="Arial" panose="020B0604020202020204" pitchFamily="34" charset="0"/>
+                <a:cs typeface="Arial" panose="020B0604020202020204" pitchFamily="34" charset="0"/>
+              </a:rPr>
+              <a:t>i_el_div</a:t>
+            </a:r>
+            <a:r>
+              <a:rPr lang="en-US" sz="1000" b="1" dirty="0">
+                <a:solidFill>
+                  <a:schemeClr val="tx1"/>
+                </a:solidFill>
+                <a:latin typeface="Arial" panose="020B0604020202020204" pitchFamily="34" charset="0"/>
+                <a:cs typeface="Arial" panose="020B0604020202020204" pitchFamily="34" charset="0"/>
+              </a:rPr>
+              <a:t>); </a:t>
+            </a:r>
+          </a:p>
+          <a:p>
+            <a:r>
+              <a:rPr lang="en-US" sz="1000" b="1" dirty="0">
+                <a:solidFill>
+                  <a:schemeClr val="tx1"/>
+                </a:solidFill>
+                <a:latin typeface="Arial" panose="020B0604020202020204" pitchFamily="34" charset="0"/>
+                <a:cs typeface="Arial" panose="020B0604020202020204" pitchFamily="34" charset="0"/>
+              </a:rPr>
+              <a:t>     };</a:t>
+            </a:r>
+          </a:p>
+          <a:p>
+            <a:endParaRPr lang="en-US" sz="200" b="1" dirty="0">
+              <a:solidFill>
+                <a:schemeClr val="tx1"/>
+              </a:solidFill>
+              <a:latin typeface="Arial" panose="020B0604020202020204" pitchFamily="34" charset="0"/>
+              <a:cs typeface="Arial" panose="020B0604020202020204" pitchFamily="34" charset="0"/>
+            </a:endParaRPr>
+          </a:p>
+          <a:p>
+            <a:r>
+              <a:rPr lang="en-US" sz="1000" b="1" dirty="0">
+                <a:solidFill>
+                  <a:schemeClr val="tx1"/>
+                </a:solidFill>
+                <a:latin typeface="Arial" panose="020B0604020202020204" pitchFamily="34" charset="0"/>
+                <a:cs typeface="Arial" panose="020B0604020202020204" pitchFamily="34" charset="0"/>
+              </a:rPr>
+              <a:t>    </a:t>
+            </a:r>
+            <a:r>
+              <a:rPr lang="en-US" sz="1000" b="1" dirty="0" err="1">
+                <a:solidFill>
+                  <a:schemeClr val="tx1"/>
+                </a:solidFill>
+                <a:latin typeface="Arial" panose="020B0604020202020204" pitchFamily="34" charset="0"/>
+                <a:cs typeface="Arial" panose="020B0604020202020204" pitchFamily="34" charset="0"/>
+              </a:rPr>
+              <a:t>el_image.addEventListener</a:t>
+            </a:r>
+            <a:r>
+              <a:rPr lang="en-US" sz="1000" b="1" dirty="0">
+                <a:solidFill>
+                  <a:schemeClr val="tx1"/>
+                </a:solidFill>
+                <a:latin typeface="Arial" panose="020B0604020202020204" pitchFamily="34" charset="0"/>
+                <a:cs typeface="Arial" panose="020B0604020202020204" pitchFamily="34" charset="0"/>
+              </a:rPr>
+              <a:t>('error', </a:t>
+            </a:r>
+            <a:r>
+              <a:rPr lang="en-US" sz="1000" b="1" dirty="0" err="1">
+                <a:solidFill>
+                  <a:schemeClr val="tx1"/>
+                </a:solidFill>
+                <a:latin typeface="Arial" panose="020B0604020202020204" pitchFamily="34" charset="0"/>
+                <a:cs typeface="Arial" panose="020B0604020202020204" pitchFamily="34" charset="0"/>
+              </a:rPr>
+              <a:t>UtilImage.imageNotFound</a:t>
+            </a:r>
+            <a:r>
+              <a:rPr lang="en-US" sz="1000" b="1" dirty="0">
+                <a:solidFill>
+                  <a:schemeClr val="tx1"/>
+                </a:solidFill>
+                <a:latin typeface="Arial" panose="020B0604020202020204" pitchFamily="34" charset="0"/>
+                <a:cs typeface="Arial" panose="020B0604020202020204" pitchFamily="34" charset="0"/>
+              </a:rPr>
+              <a:t>);</a:t>
+            </a:r>
+          </a:p>
+          <a:p>
+            <a:endParaRPr lang="en-US" sz="200" b="1" dirty="0">
+              <a:solidFill>
+                <a:schemeClr val="tx1"/>
+              </a:solidFill>
+              <a:latin typeface="Arial" panose="020B0604020202020204" pitchFamily="34" charset="0"/>
+              <a:cs typeface="Arial" panose="020B0604020202020204" pitchFamily="34" charset="0"/>
+            </a:endParaRPr>
+          </a:p>
+          <a:p>
+            <a:r>
+              <a:rPr lang="en-US" sz="1000" b="1" dirty="0">
+                <a:solidFill>
+                  <a:schemeClr val="tx1"/>
+                </a:solidFill>
+                <a:latin typeface="Arial" panose="020B0604020202020204" pitchFamily="34" charset="0"/>
+                <a:cs typeface="Arial" panose="020B0604020202020204" pitchFamily="34" charset="0"/>
+              </a:rPr>
+              <a:t>    </a:t>
+            </a:r>
+            <a:r>
+              <a:rPr lang="en-US" sz="1000" b="1" dirty="0" err="1">
+                <a:solidFill>
+                  <a:schemeClr val="tx1"/>
+                </a:solidFill>
+                <a:latin typeface="Arial" panose="020B0604020202020204" pitchFamily="34" charset="0"/>
+                <a:cs typeface="Arial" panose="020B0604020202020204" pitchFamily="34" charset="0"/>
+              </a:rPr>
+              <a:t>el_image.src</a:t>
+            </a:r>
+            <a:r>
+              <a:rPr lang="en-US" sz="1000" b="1" dirty="0">
+                <a:solidFill>
+                  <a:schemeClr val="tx1"/>
+                </a:solidFill>
+                <a:latin typeface="Arial" panose="020B0604020202020204" pitchFamily="34" charset="0"/>
+                <a:cs typeface="Arial" panose="020B0604020202020204" pitchFamily="34" charset="0"/>
+              </a:rPr>
+              <a:t> = </a:t>
+            </a:r>
+            <a:r>
+              <a:rPr lang="en-US" sz="1000" b="1" dirty="0" err="1">
+                <a:solidFill>
+                  <a:schemeClr val="tx1"/>
+                </a:solidFill>
+                <a:latin typeface="Arial" panose="020B0604020202020204" pitchFamily="34" charset="0"/>
+                <a:cs typeface="Arial" panose="020B0604020202020204" pitchFamily="34" charset="0"/>
+              </a:rPr>
+              <a:t>i_image_file_name</a:t>
+            </a:r>
+            <a:r>
+              <a:rPr lang="en-US" sz="1000" b="1" dirty="0">
+                <a:solidFill>
+                  <a:schemeClr val="tx1"/>
+                </a:solidFill>
+                <a:latin typeface="Arial" panose="020B0604020202020204" pitchFamily="34" charset="0"/>
+                <a:cs typeface="Arial" panose="020B0604020202020204" pitchFamily="34" charset="0"/>
+              </a:rPr>
+              <a:t>;</a:t>
+            </a:r>
+          </a:p>
+          <a:p>
+            <a:r>
+              <a:rPr lang="en-US" sz="1000" b="1" dirty="0">
+                <a:solidFill>
+                  <a:schemeClr val="tx1"/>
+                </a:solidFill>
+                <a:latin typeface="Arial" panose="020B0604020202020204" pitchFamily="34" charset="0"/>
+                <a:cs typeface="Arial" panose="020B0604020202020204" pitchFamily="34" charset="0"/>
+              </a:rPr>
+              <a:t>}</a:t>
+            </a:r>
+          </a:p>
+          <a:p>
+            <a:endParaRPr lang="en-US" sz="1000" b="1" dirty="0">
+              <a:solidFill>
+                <a:schemeClr val="tx1"/>
+              </a:solidFill>
+              <a:latin typeface="Arial" panose="020B0604020202020204" pitchFamily="34" charset="0"/>
+              <a:cs typeface="Arial" panose="020B0604020202020204" pitchFamily="34" charset="0"/>
+            </a:endParaRPr>
+          </a:p>
+          <a:p>
+            <a:r>
+              <a:rPr lang="en-US" sz="1000" i="1" dirty="0">
+                <a:solidFill>
+                  <a:schemeClr val="tx1"/>
+                </a:solidFill>
+                <a:latin typeface="Arial" panose="020B0604020202020204" pitchFamily="34" charset="0"/>
+                <a:cs typeface="Arial" panose="020B0604020202020204" pitchFamily="34" charset="0"/>
+              </a:rPr>
+              <a:t>// This event function will execute when the image has been loaded</a:t>
+            </a:r>
+          </a:p>
+          <a:p>
+            <a:r>
+              <a:rPr lang="en-US" sz="1000" b="1" dirty="0">
+                <a:solidFill>
+                  <a:schemeClr val="tx1"/>
+                </a:solidFill>
+                <a:latin typeface="Arial" panose="020B0604020202020204" pitchFamily="34" charset="0"/>
+                <a:cs typeface="Arial" panose="020B0604020202020204" pitchFamily="34" charset="0"/>
+              </a:rPr>
+              <a:t>static </a:t>
+            </a:r>
+            <a:r>
+              <a:rPr lang="en-US" sz="1000" b="1" dirty="0" err="1">
+                <a:solidFill>
+                  <a:schemeClr val="tx1"/>
+                </a:solidFill>
+                <a:latin typeface="Arial" panose="020B0604020202020204" pitchFamily="34" charset="0"/>
+                <a:cs typeface="Arial" panose="020B0604020202020204" pitchFamily="34" charset="0"/>
+              </a:rPr>
+              <a:t>replaceImageInDivContainerAfterLoad</a:t>
+            </a:r>
+            <a:r>
+              <a:rPr lang="en-US" sz="1000" b="1" dirty="0">
+                <a:solidFill>
+                  <a:schemeClr val="tx1"/>
+                </a:solidFill>
+                <a:latin typeface="Arial" panose="020B0604020202020204" pitchFamily="34" charset="0"/>
+                <a:cs typeface="Arial" panose="020B0604020202020204" pitchFamily="34" charset="0"/>
+              </a:rPr>
+              <a:t> (</a:t>
+            </a:r>
+            <a:r>
+              <a:rPr lang="en-US" sz="1000" b="1" dirty="0" err="1">
+                <a:solidFill>
+                  <a:schemeClr val="tx1"/>
+                </a:solidFill>
+                <a:latin typeface="Arial" panose="020B0604020202020204" pitchFamily="34" charset="0"/>
+                <a:cs typeface="Arial" panose="020B0604020202020204" pitchFamily="34" charset="0"/>
+              </a:rPr>
+              <a:t>el_image</a:t>
+            </a:r>
+            <a:r>
+              <a:rPr lang="en-US" sz="1000" b="1" dirty="0">
+                <a:solidFill>
+                  <a:schemeClr val="tx1"/>
+                </a:solidFill>
+                <a:latin typeface="Arial" panose="020B0604020202020204" pitchFamily="34" charset="0"/>
+                <a:cs typeface="Arial" panose="020B0604020202020204" pitchFamily="34" charset="0"/>
+              </a:rPr>
+              <a:t>, </a:t>
+            </a:r>
+            <a:r>
+              <a:rPr lang="en-US" sz="1000" b="1" dirty="0" err="1">
+                <a:solidFill>
+                  <a:schemeClr val="tx1"/>
+                </a:solidFill>
+                <a:latin typeface="Arial" panose="020B0604020202020204" pitchFamily="34" charset="0"/>
+                <a:cs typeface="Arial" panose="020B0604020202020204" pitchFamily="34" charset="0"/>
+              </a:rPr>
+              <a:t>el_image</a:t>
+            </a:r>
+            <a:r>
+              <a:rPr lang="en-US" sz="1000" b="1" dirty="0">
+                <a:solidFill>
+                  <a:schemeClr val="tx1"/>
+                </a:solidFill>
+                <a:latin typeface="Arial" panose="020B0604020202020204" pitchFamily="34" charset="0"/>
+                <a:cs typeface="Arial" panose="020B0604020202020204" pitchFamily="34" charset="0"/>
+              </a:rPr>
+              <a:t>, </a:t>
+            </a:r>
+            <a:r>
+              <a:rPr lang="en-US" sz="1000" b="1" dirty="0" err="1">
+                <a:solidFill>
+                  <a:schemeClr val="tx1"/>
+                </a:solidFill>
+                <a:latin typeface="Arial" panose="020B0604020202020204" pitchFamily="34" charset="0"/>
+                <a:cs typeface="Arial" panose="020B0604020202020204" pitchFamily="34" charset="0"/>
+              </a:rPr>
+              <a:t>i_el_div</a:t>
+            </a:r>
+            <a:r>
+              <a:rPr lang="en-US" sz="1000" b="1" dirty="0">
+                <a:solidFill>
+                  <a:schemeClr val="tx1"/>
+                </a:solidFill>
+                <a:latin typeface="Arial" panose="020B0604020202020204" pitchFamily="34" charset="0"/>
+                <a:cs typeface="Arial" panose="020B0604020202020204" pitchFamily="34" charset="0"/>
+              </a:rPr>
+              <a:t>)</a:t>
+            </a:r>
+          </a:p>
+          <a:p>
+            <a:r>
+              <a:rPr lang="en-US" sz="1000" b="1" i="1" dirty="0">
+                <a:solidFill>
+                  <a:schemeClr val="tx1"/>
+                </a:solidFill>
+                <a:latin typeface="Arial" panose="020B0604020202020204" pitchFamily="34" charset="0"/>
+                <a:cs typeface="Arial" panose="020B0604020202020204" pitchFamily="34" charset="0"/>
+              </a:rPr>
+              <a:t>{</a:t>
+            </a:r>
+          </a:p>
+          <a:p>
+            <a:r>
+              <a:rPr lang="en-US" sz="1000" b="1" i="1" dirty="0">
+                <a:solidFill>
+                  <a:schemeClr val="tx1"/>
+                </a:solidFill>
+                <a:latin typeface="Arial" panose="020B0604020202020204" pitchFamily="34" charset="0"/>
+                <a:cs typeface="Arial" panose="020B0604020202020204" pitchFamily="34" charset="0"/>
+              </a:rPr>
+              <a:t>    // </a:t>
+            </a:r>
+            <a:r>
+              <a:rPr lang="en-US" sz="1000" i="1" dirty="0">
+                <a:solidFill>
+                  <a:schemeClr val="tx1"/>
+                </a:solidFill>
+                <a:latin typeface="Arial" panose="020B0604020202020204" pitchFamily="34" charset="0"/>
+                <a:cs typeface="Arial" panose="020B0604020202020204" pitchFamily="34" charset="0"/>
+              </a:rPr>
+              <a:t>Calculates height. </a:t>
+            </a:r>
+            <a:r>
+              <a:rPr lang="en-US" sz="1000" i="1" dirty="0" err="1">
+                <a:solidFill>
+                  <a:schemeClr val="tx1"/>
+                </a:solidFill>
+                <a:latin typeface="Arial" panose="020B0604020202020204" pitchFamily="34" charset="0"/>
+                <a:cs typeface="Arial" panose="020B0604020202020204" pitchFamily="34" charset="0"/>
+              </a:rPr>
+              <a:t>widht</a:t>
+            </a:r>
+            <a:r>
+              <a:rPr lang="en-US" sz="1000" i="1" dirty="0">
+                <a:solidFill>
+                  <a:schemeClr val="tx1"/>
+                </a:solidFill>
+                <a:latin typeface="Arial" panose="020B0604020202020204" pitchFamily="34" charset="0"/>
+                <a:cs typeface="Arial" panose="020B0604020202020204" pitchFamily="34" charset="0"/>
+              </a:rPr>
+              <a:t> an position of the image </a:t>
+            </a:r>
+          </a:p>
+          <a:p>
+            <a:r>
+              <a:rPr lang="en-US" sz="1000" i="1" dirty="0">
+                <a:solidFill>
+                  <a:schemeClr val="tx1"/>
+                </a:solidFill>
+                <a:latin typeface="Arial" panose="020B0604020202020204" pitchFamily="34" charset="0"/>
+                <a:cs typeface="Arial" panose="020B0604020202020204" pitchFamily="34" charset="0"/>
+              </a:rPr>
+              <a:t>    // Callis </a:t>
+            </a:r>
+            <a:r>
+              <a:rPr lang="en-US" sz="1000" b="1" dirty="0" err="1">
+                <a:solidFill>
+                  <a:schemeClr val="tx1"/>
+                </a:solidFill>
+                <a:latin typeface="Arial" panose="020B0604020202020204" pitchFamily="34" charset="0"/>
+                <a:cs typeface="Arial" panose="020B0604020202020204" pitchFamily="34" charset="0"/>
+              </a:rPr>
+              <a:t>getFitImageToDivScaleFactor</a:t>
+            </a:r>
+            <a:r>
+              <a:rPr lang="en-US" sz="1000" b="1" dirty="0">
+                <a:solidFill>
+                  <a:schemeClr val="tx1"/>
+                </a:solidFill>
+                <a:latin typeface="Arial" panose="020B0604020202020204" pitchFamily="34" charset="0"/>
+                <a:cs typeface="Arial" panose="020B0604020202020204" pitchFamily="34" charset="0"/>
+              </a:rPr>
+              <a:t> </a:t>
+            </a:r>
+            <a:r>
+              <a:rPr lang="en-US" sz="1000" i="1" dirty="0">
+                <a:solidFill>
+                  <a:schemeClr val="tx1"/>
+                </a:solidFill>
+                <a:latin typeface="Arial" panose="020B0604020202020204" pitchFamily="34" charset="0"/>
+                <a:cs typeface="Arial" panose="020B0604020202020204" pitchFamily="34" charset="0"/>
+              </a:rPr>
+              <a:t>and</a:t>
+            </a:r>
+            <a:r>
+              <a:rPr lang="en-US" sz="1000" b="1" dirty="0">
+                <a:solidFill>
+                  <a:schemeClr val="tx1"/>
+                </a:solidFill>
+                <a:latin typeface="Arial" panose="020B0604020202020204" pitchFamily="34" charset="0"/>
+                <a:cs typeface="Arial" panose="020B0604020202020204" pitchFamily="34" charset="0"/>
+              </a:rPr>
+              <a:t> </a:t>
+            </a:r>
+            <a:r>
+              <a:rPr lang="en-US" sz="1000" b="1" dirty="0" err="1">
+                <a:solidFill>
+                  <a:schemeClr val="tx1"/>
+                </a:solidFill>
+                <a:latin typeface="Arial" panose="020B0604020202020204" pitchFamily="34" charset="0"/>
+                <a:cs typeface="Arial" panose="020B0604020202020204" pitchFamily="34" charset="0"/>
+              </a:rPr>
+              <a:t>centerImage</a:t>
+            </a:r>
+            <a:endParaRPr lang="en-US" sz="1000" b="1" dirty="0">
+              <a:solidFill>
+                <a:schemeClr val="tx1"/>
+              </a:solidFill>
+              <a:latin typeface="Arial" panose="020B0604020202020204" pitchFamily="34" charset="0"/>
+              <a:cs typeface="Arial" panose="020B0604020202020204" pitchFamily="34" charset="0"/>
+            </a:endParaRPr>
+          </a:p>
+          <a:p>
+            <a:r>
+              <a:rPr lang="en-US" sz="1000" b="1" dirty="0">
+                <a:solidFill>
+                  <a:schemeClr val="tx1"/>
+                </a:solidFill>
+                <a:latin typeface="Arial" panose="020B0604020202020204" pitchFamily="34" charset="0"/>
+                <a:cs typeface="Arial" panose="020B0604020202020204" pitchFamily="34" charset="0"/>
+              </a:rPr>
+              <a:t>    </a:t>
+            </a:r>
+            <a:r>
+              <a:rPr lang="en-US" sz="1000" i="1" dirty="0">
+                <a:solidFill>
+                  <a:schemeClr val="tx1"/>
+                </a:solidFill>
+                <a:latin typeface="Arial" panose="020B0604020202020204" pitchFamily="34" charset="0"/>
+                <a:cs typeface="Arial" panose="020B0604020202020204" pitchFamily="34" charset="0"/>
+              </a:rPr>
+              <a:t>// Setts the calculated values</a:t>
+            </a:r>
+            <a:endParaRPr lang="en-US" sz="1000" b="1" i="1" dirty="0">
+              <a:solidFill>
+                <a:schemeClr val="tx1"/>
+              </a:solidFill>
+              <a:latin typeface="Arial" panose="020B0604020202020204" pitchFamily="34" charset="0"/>
+              <a:cs typeface="Arial" panose="020B0604020202020204" pitchFamily="34" charset="0"/>
+            </a:endParaRPr>
+          </a:p>
+          <a:p>
+            <a:r>
+              <a:rPr lang="en-US" sz="1000" b="1" i="1" dirty="0">
+                <a:solidFill>
+                  <a:schemeClr val="tx1"/>
+                </a:solidFill>
+                <a:latin typeface="Arial" panose="020B0604020202020204" pitchFamily="34" charset="0"/>
+                <a:cs typeface="Arial" panose="020B0604020202020204" pitchFamily="34" charset="0"/>
+              </a:rPr>
+              <a:t>}</a:t>
+            </a:r>
+          </a:p>
+          <a:p>
+            <a:endParaRPr lang="en-US" sz="1000" b="1" i="1" dirty="0">
+              <a:solidFill>
+                <a:schemeClr val="tx1"/>
+              </a:solidFill>
+              <a:latin typeface="Arial" panose="020B0604020202020204" pitchFamily="34" charset="0"/>
+              <a:cs typeface="Arial" panose="020B0604020202020204" pitchFamily="34" charset="0"/>
+            </a:endParaRPr>
+          </a:p>
+          <a:p>
+            <a:r>
+              <a:rPr lang="en-US" sz="1000" b="1" dirty="0">
+                <a:solidFill>
+                  <a:schemeClr val="tx1"/>
+                </a:solidFill>
+                <a:latin typeface="Arial" panose="020B0604020202020204" pitchFamily="34" charset="0"/>
+                <a:cs typeface="Arial" panose="020B0604020202020204" pitchFamily="34" charset="0"/>
+              </a:rPr>
+              <a:t>static</a:t>
+            </a:r>
+            <a:r>
+              <a:rPr lang="en-US" sz="1000" i="1" dirty="0">
+                <a:solidFill>
+                  <a:schemeClr val="tx1"/>
+                </a:solidFill>
+                <a:latin typeface="Arial" panose="020B0604020202020204" pitchFamily="34" charset="0"/>
+                <a:cs typeface="Arial" panose="020B0604020202020204" pitchFamily="34" charset="0"/>
+              </a:rPr>
+              <a:t> </a:t>
+            </a:r>
+            <a:r>
+              <a:rPr lang="en-US" sz="1000" b="1" dirty="0" err="1">
+                <a:solidFill>
+                  <a:schemeClr val="tx1"/>
+                </a:solidFill>
+                <a:latin typeface="Arial" panose="020B0604020202020204" pitchFamily="34" charset="0"/>
+                <a:cs typeface="Arial" panose="020B0604020202020204" pitchFamily="34" charset="0"/>
+              </a:rPr>
+              <a:t>imageNotFound</a:t>
+            </a:r>
+            <a:r>
+              <a:rPr lang="en-US" sz="1000" b="1" dirty="0">
+                <a:solidFill>
+                  <a:schemeClr val="tx1"/>
+                </a:solidFill>
+                <a:latin typeface="Arial" panose="020B0604020202020204" pitchFamily="34" charset="0"/>
+                <a:cs typeface="Arial" panose="020B0604020202020204" pitchFamily="34" charset="0"/>
+              </a:rPr>
+              <a:t> { alert(“Error message”); }</a:t>
             </a:r>
           </a:p>
           <a:p>

</xml_diff>

<commit_message>
Improvement and description UtilImage
</commit_message>
<xml_diff>
--- a/Description/Utils.pptx
+++ b/Description/Utils.pptx
@@ -272,7 +272,7 @@
           <a:p>
             <a:fld id="{DDCE6D58-9B57-4731-A47B-3CD41B48F0A9}" type="datetimeFigureOut">
               <a:rPr lang="de-CH" smtClean="0"/>
-              <a:t>06.04.2025</a:t>
+              <a:t>07.04.2025</a:t>
             </a:fld>
             <a:endParaRPr lang="de-CH"/>
           </a:p>
@@ -442,7 +442,7 @@
           <a:p>
             <a:fld id="{DDCE6D58-9B57-4731-A47B-3CD41B48F0A9}" type="datetimeFigureOut">
               <a:rPr lang="de-CH" smtClean="0"/>
-              <a:t>06.04.2025</a:t>
+              <a:t>07.04.2025</a:t>
             </a:fld>
             <a:endParaRPr lang="de-CH"/>
           </a:p>
@@ -622,7 +622,7 @@
           <a:p>
             <a:fld id="{DDCE6D58-9B57-4731-A47B-3CD41B48F0A9}" type="datetimeFigureOut">
               <a:rPr lang="de-CH" smtClean="0"/>
-              <a:t>06.04.2025</a:t>
+              <a:t>07.04.2025</a:t>
             </a:fld>
             <a:endParaRPr lang="de-CH"/>
           </a:p>
@@ -792,7 +792,7 @@
           <a:p>
             <a:fld id="{DDCE6D58-9B57-4731-A47B-3CD41B48F0A9}" type="datetimeFigureOut">
               <a:rPr lang="de-CH" smtClean="0"/>
-              <a:t>06.04.2025</a:t>
+              <a:t>07.04.2025</a:t>
             </a:fld>
             <a:endParaRPr lang="de-CH"/>
           </a:p>
@@ -1038,7 +1038,7 @@
           <a:p>
             <a:fld id="{DDCE6D58-9B57-4731-A47B-3CD41B48F0A9}" type="datetimeFigureOut">
               <a:rPr lang="de-CH" smtClean="0"/>
-              <a:t>06.04.2025</a:t>
+              <a:t>07.04.2025</a:t>
             </a:fld>
             <a:endParaRPr lang="de-CH"/>
           </a:p>
@@ -1270,7 +1270,7 @@
           <a:p>
             <a:fld id="{DDCE6D58-9B57-4731-A47B-3CD41B48F0A9}" type="datetimeFigureOut">
               <a:rPr lang="de-CH" smtClean="0"/>
-              <a:t>06.04.2025</a:t>
+              <a:t>07.04.2025</a:t>
             </a:fld>
             <a:endParaRPr lang="de-CH"/>
           </a:p>
@@ -1637,7 +1637,7 @@
           <a:p>
             <a:fld id="{DDCE6D58-9B57-4731-A47B-3CD41B48F0A9}" type="datetimeFigureOut">
               <a:rPr lang="de-CH" smtClean="0"/>
-              <a:t>06.04.2025</a:t>
+              <a:t>07.04.2025</a:t>
             </a:fld>
             <a:endParaRPr lang="de-CH"/>
           </a:p>
@@ -1755,7 +1755,7 @@
           <a:p>
             <a:fld id="{DDCE6D58-9B57-4731-A47B-3CD41B48F0A9}" type="datetimeFigureOut">
               <a:rPr lang="de-CH" smtClean="0"/>
-              <a:t>06.04.2025</a:t>
+              <a:t>07.04.2025</a:t>
             </a:fld>
             <a:endParaRPr lang="de-CH"/>
           </a:p>
@@ -1850,7 +1850,7 @@
           <a:p>
             <a:fld id="{DDCE6D58-9B57-4731-A47B-3CD41B48F0A9}" type="datetimeFigureOut">
               <a:rPr lang="de-CH" smtClean="0"/>
-              <a:t>06.04.2025</a:t>
+              <a:t>07.04.2025</a:t>
             </a:fld>
             <a:endParaRPr lang="de-CH"/>
           </a:p>
@@ -2127,7 +2127,7 @@
           <a:p>
             <a:fld id="{DDCE6D58-9B57-4731-A47B-3CD41B48F0A9}" type="datetimeFigureOut">
               <a:rPr lang="de-CH" smtClean="0"/>
-              <a:t>06.04.2025</a:t>
+              <a:t>07.04.2025</a:t>
             </a:fld>
             <a:endParaRPr lang="de-CH"/>
           </a:p>
@@ -2380,7 +2380,7 @@
           <a:p>
             <a:fld id="{DDCE6D58-9B57-4731-A47B-3CD41B48F0A9}" type="datetimeFigureOut">
               <a:rPr lang="de-CH" smtClean="0"/>
-              <a:t>06.04.2025</a:t>
+              <a:t>07.04.2025</a:t>
             </a:fld>
             <a:endParaRPr lang="de-CH"/>
           </a:p>
@@ -2593,7 +2593,7 @@
           <a:p>
             <a:fld id="{DDCE6D58-9B57-4731-A47B-3CD41B48F0A9}" type="datetimeFigureOut">
               <a:rPr lang="de-CH" smtClean="0"/>
-              <a:t>06.04.2025</a:t>
+              <a:t>07.04.2025</a:t>
             </a:fld>
             <a:endParaRPr lang="de-CH"/>
           </a:p>
@@ -4906,7 +4906,7 @@
                 <a:latin typeface="Arial" panose="020B0604020202020204" pitchFamily="34" charset="0"/>
                 <a:cs typeface="Arial" panose="020B0604020202020204" pitchFamily="34" charset="0"/>
               </a:rPr>
-              <a:t>Scalie</a:t>
+              <a:t>Replace</a:t>
             </a:r>
             <a:r>
               <a:rPr lang="de-CH" sz="1200" dirty="0">
@@ -4916,6 +4916,26 @@
                 <a:latin typeface="Arial" panose="020B0604020202020204" pitchFamily="34" charset="0"/>
                 <a:cs typeface="Arial" panose="020B0604020202020204" pitchFamily="34" charset="0"/>
               </a:rPr>
+              <a:t>, </a:t>
+            </a:r>
+            <a:r>
+              <a:rPr lang="de-CH" sz="1200" dirty="0" err="1">
+                <a:solidFill>
+                  <a:schemeClr val="tx1"/>
+                </a:solidFill>
+                <a:latin typeface="Arial" panose="020B0604020202020204" pitchFamily="34" charset="0"/>
+                <a:cs typeface="Arial" panose="020B0604020202020204" pitchFamily="34" charset="0"/>
+              </a:rPr>
+              <a:t>scale</a:t>
+            </a:r>
+            <a:r>
+              <a:rPr lang="de-CH" sz="1200" dirty="0">
+                <a:solidFill>
+                  <a:schemeClr val="tx1"/>
+                </a:solidFill>
+                <a:latin typeface="Arial" panose="020B0604020202020204" pitchFamily="34" charset="0"/>
+                <a:cs typeface="Arial" panose="020B0604020202020204" pitchFamily="34" charset="0"/>
+              </a:rPr>
               <a:t> and </a:t>
             </a:r>
             <a:r>
@@ -4956,25 +4976,8 @@
                 <a:latin typeface="Arial" panose="020B0604020202020204" pitchFamily="34" charset="0"/>
                 <a:cs typeface="Arial" panose="020B0604020202020204" pitchFamily="34" charset="0"/>
               </a:rPr>
-              <a:t> in a </a:t>
-            </a:r>
-            <a:r>
-              <a:rPr lang="de-CH" sz="1200" dirty="0" err="1">
-                <a:solidFill>
-                  <a:schemeClr val="tx1"/>
-                </a:solidFill>
-                <a:latin typeface="Arial" panose="020B0604020202020204" pitchFamily="34" charset="0"/>
-                <a:cs typeface="Arial" panose="020B0604020202020204" pitchFamily="34" charset="0"/>
-              </a:rPr>
-              <a:t>container</a:t>
-            </a:r>
-            <a:endParaRPr lang="de-CH" sz="1200" dirty="0">
-              <a:solidFill>
-                <a:schemeClr val="tx1"/>
-              </a:solidFill>
-              <a:latin typeface="Arial" panose="020B0604020202020204" pitchFamily="34" charset="0"/>
-              <a:cs typeface="Arial" panose="020B0604020202020204" pitchFamily="34" charset="0"/>
-            </a:endParaRPr>
+              <a:t> in a div </a:t>
+            </a:r>
           </a:p>
         </p:txBody>
       </p:sp>
@@ -5047,7 +5050,7 @@
           </a:p>
           <a:p>
             <a:r>
-              <a:rPr lang="en-US" sz="1000" b="1" dirty="0" err="1">
+              <a:rPr lang="en-US" sz="1200" b="1" dirty="0" err="1">
                 <a:solidFill>
                   <a:schemeClr val="tx1"/>
                 </a:solidFill>
@@ -5056,6 +5059,27 @@
               </a:rPr>
               <a:t>replaceImageInDivContainer</a:t>
             </a:r>
+            <a:endParaRPr lang="en-US" sz="1200" b="1" dirty="0">
+              <a:solidFill>
+                <a:schemeClr val="tx1"/>
+              </a:solidFill>
+              <a:latin typeface="Arial" panose="020B0604020202020204" pitchFamily="34" charset="0"/>
+              <a:cs typeface="Arial" panose="020B0604020202020204" pitchFamily="34" charset="0"/>
+            </a:endParaRPr>
+          </a:p>
+          <a:p>
+            <a:r>
+              <a:rPr lang="en-US" sz="1200" i="1" dirty="0">
+                <a:solidFill>
+                  <a:schemeClr val="tx1"/>
+                </a:solidFill>
+                <a:latin typeface="Arial" panose="020B0604020202020204" pitchFamily="34" charset="0"/>
+                <a:cs typeface="Arial" panose="020B0604020202020204" pitchFamily="34" charset="0"/>
+              </a:rPr>
+              <a:t>Replace and fit an image in a container &lt;div&gt;</a:t>
+            </a:r>
+          </a:p>
+          <a:p>
             <a:endParaRPr lang="en-US" sz="1000" b="1" dirty="0">
               <a:solidFill>
                 <a:schemeClr val="tx1"/>
@@ -5066,17 +5090,15 @@
           </a:p>
           <a:p>
             <a:r>
-              <a:rPr lang="en-US" sz="1000" i="1" dirty="0">
-                <a:solidFill>
-                  <a:schemeClr val="tx1"/>
-                </a:solidFill>
-                <a:latin typeface="Arial" panose="020B0604020202020204" pitchFamily="34" charset="0"/>
-                <a:cs typeface="Arial" panose="020B0604020202020204" pitchFamily="34" charset="0"/>
-              </a:rPr>
-              <a:t>Replace and fit an image in a container &lt;div&gt;</a:t>
-            </a:r>
-          </a:p>
-          <a:p>
+              <a:rPr lang="en-US" sz="1000" b="1" dirty="0" err="1">
+                <a:solidFill>
+                  <a:schemeClr val="tx1"/>
+                </a:solidFill>
+                <a:latin typeface="Arial" panose="020B0604020202020204" pitchFamily="34" charset="0"/>
+                <a:cs typeface="Arial" panose="020B0604020202020204" pitchFamily="34" charset="0"/>
+              </a:rPr>
+              <a:t>callbackAfterLoad</a:t>
+            </a:r>
             <a:endParaRPr lang="en-US" sz="1000" b="1" dirty="0">
               <a:solidFill>
                 <a:schemeClr val="tx1"/>
@@ -5087,6 +5109,27 @@
           </a:p>
           <a:p>
             <a:r>
+              <a:rPr lang="en-US" sz="1000" i="1" dirty="0">
+                <a:solidFill>
+                  <a:schemeClr val="tx1"/>
+                </a:solidFill>
+                <a:latin typeface="Arial" panose="020B0604020202020204" pitchFamily="34" charset="0"/>
+                <a:cs typeface="Arial" panose="020B0604020202020204" pitchFamily="34" charset="0"/>
+              </a:rPr>
+              <a:t>Replace an image in a &lt;div&gt; container after load of the new picture </a:t>
+            </a:r>
+          </a:p>
+          <a:p>
+            <a:endParaRPr lang="en-US" sz="1000" i="1" dirty="0">
+              <a:solidFill>
+                <a:schemeClr val="tx1"/>
+              </a:solidFill>
+              <a:latin typeface="Arial" panose="020B0604020202020204" pitchFamily="34" charset="0"/>
+              <a:cs typeface="Arial" panose="020B0604020202020204" pitchFamily="34" charset="0"/>
+            </a:endParaRPr>
+          </a:p>
+          <a:p>
+            <a:r>
               <a:rPr lang="en-US" sz="1000" b="1" dirty="0" err="1">
                 <a:solidFill>
                   <a:schemeClr val="tx1"/>
@@ -5094,7 +5137,7 @@
                 <a:latin typeface="Arial" panose="020B0604020202020204" pitchFamily="34" charset="0"/>
                 <a:cs typeface="Arial" panose="020B0604020202020204" pitchFamily="34" charset="0"/>
               </a:rPr>
-              <a:t>replaceImageInDivContainerAfterLoad</a:t>
+              <a:t>centerImage</a:t>
             </a:r>
             <a:endParaRPr lang="en-US" sz="1000" b="1" dirty="0">
               <a:solidFill>
@@ -5113,7 +5156,7 @@
                 <a:latin typeface="Arial" panose="020B0604020202020204" pitchFamily="34" charset="0"/>
                 <a:cs typeface="Arial" panose="020B0604020202020204" pitchFamily="34" charset="0"/>
               </a:rPr>
-              <a:t>Replace an image in a &lt;div&gt; container after load of the new picture </a:t>
+              <a:t>Place the picture in the center. Vertically and horizontally</a:t>
             </a:r>
           </a:p>
           <a:p>
@@ -5134,7 +5177,7 @@
                 <a:latin typeface="Arial" panose="020B0604020202020204" pitchFamily="34" charset="0"/>
                 <a:cs typeface="Arial" panose="020B0604020202020204" pitchFamily="34" charset="0"/>
               </a:rPr>
-              <a:t>centerImage</a:t>
+              <a:t>getImageElement</a:t>
             </a:r>
             <a:endParaRPr lang="en-US" sz="1000" b="1" dirty="0">
               <a:solidFill>
@@ -5153,7 +5196,7 @@
                 <a:latin typeface="Arial" panose="020B0604020202020204" pitchFamily="34" charset="0"/>
                 <a:cs typeface="Arial" panose="020B0604020202020204" pitchFamily="34" charset="0"/>
               </a:rPr>
-              <a:t>Place the picture in the center. Vertically and horizontally</a:t>
+              <a:t>Returns the image element of the image container div</a:t>
             </a:r>
           </a:p>
           <a:p>
@@ -5174,7 +5217,7 @@
                 <a:latin typeface="Arial" panose="020B0604020202020204" pitchFamily="34" charset="0"/>
                 <a:cs typeface="Arial" panose="020B0604020202020204" pitchFamily="34" charset="0"/>
               </a:rPr>
-              <a:t>getImageElement</a:t>
+              <a:t>getFitImageToDivScaleFactor</a:t>
             </a:r>
             <a:endParaRPr lang="en-US" sz="1000" b="1" dirty="0">
               <a:solidFill>
@@ -5193,7 +5236,7 @@
                 <a:latin typeface="Arial" panose="020B0604020202020204" pitchFamily="34" charset="0"/>
                 <a:cs typeface="Arial" panose="020B0604020202020204" pitchFamily="34" charset="0"/>
               </a:rPr>
-              <a:t>Returns the image element of the image container div</a:t>
+              <a:t>Returns the scale factor for an image that makes it fit to a given div element</a:t>
             </a:r>
           </a:p>
           <a:p>
@@ -5214,47 +5257,7 @@
                 <a:latin typeface="Arial" panose="020B0604020202020204" pitchFamily="34" charset="0"/>
                 <a:cs typeface="Arial" panose="020B0604020202020204" pitchFamily="34" charset="0"/>
               </a:rPr>
-              <a:t>getFitImageToDivScaleFactor</a:t>
-            </a:r>
-            <a:endParaRPr lang="en-US" sz="1000" b="1" dirty="0">
-              <a:solidFill>
-                <a:schemeClr val="tx1"/>
-              </a:solidFill>
-              <a:latin typeface="Arial" panose="020B0604020202020204" pitchFamily="34" charset="0"/>
-              <a:cs typeface="Arial" panose="020B0604020202020204" pitchFamily="34" charset="0"/>
-            </a:endParaRPr>
-          </a:p>
-          <a:p>
-            <a:r>
-              <a:rPr lang="en-US" sz="1000" i="1" dirty="0">
-                <a:solidFill>
-                  <a:schemeClr val="tx1"/>
-                </a:solidFill>
-                <a:latin typeface="Arial" panose="020B0604020202020204" pitchFamily="34" charset="0"/>
-                <a:cs typeface="Arial" panose="020B0604020202020204" pitchFamily="34" charset="0"/>
-              </a:rPr>
-              <a:t>Returns the scale factor for an image that makes it fit to a given div element</a:t>
-            </a:r>
-          </a:p>
-          <a:p>
-            <a:endParaRPr lang="en-US" sz="1000" i="1" dirty="0">
-              <a:solidFill>
-                <a:schemeClr val="tx1"/>
-              </a:solidFill>
-              <a:latin typeface="Arial" panose="020B0604020202020204" pitchFamily="34" charset="0"/>
-              <a:cs typeface="Arial" panose="020B0604020202020204" pitchFamily="34" charset="0"/>
-            </a:endParaRPr>
-          </a:p>
-          <a:p>
-            <a:r>
-              <a:rPr lang="en-US" sz="1000" b="1" dirty="0" err="1">
-                <a:solidFill>
-                  <a:schemeClr val="tx1"/>
-                </a:solidFill>
-                <a:latin typeface="Arial" panose="020B0604020202020204" pitchFamily="34" charset="0"/>
-                <a:cs typeface="Arial" panose="020B0604020202020204" pitchFamily="34" charset="0"/>
-              </a:rPr>
-              <a:t>imageNotFound</a:t>
+              <a:t>callbackImageNotFound</a:t>
             </a:r>
             <a:endParaRPr lang="en-US" sz="1000" b="1" dirty="0">
               <a:solidFill>
@@ -5302,7 +5305,7 @@
         <p:spPr>
           <a:xfrm>
             <a:off x="3671722" y="146763"/>
-            <a:ext cx="4663387" cy="4003205"/>
+            <a:ext cx="4225369" cy="3977867"/>
           </a:xfrm>
           <a:prstGeom prst="rect">
             <a:avLst/>
@@ -5615,7 +5618,120 @@
                 <a:latin typeface="Arial" panose="020B0604020202020204" pitchFamily="34" charset="0"/>
                 <a:cs typeface="Arial" panose="020B0604020202020204" pitchFamily="34" charset="0"/>
               </a:rPr>
-              <a:t>UtilImage.replaceImageInDivContainerAfterLoad</a:t>
+              <a:t>UtilImage.callbackAfterLoad</a:t>
+            </a:r>
+            <a:r>
+              <a:rPr lang="en-US" sz="1000" b="1" dirty="0">
+                <a:solidFill>
+                  <a:schemeClr val="tx1"/>
+                </a:solidFill>
+                <a:latin typeface="Arial" panose="020B0604020202020204" pitchFamily="34" charset="0"/>
+                <a:cs typeface="Arial" panose="020B0604020202020204" pitchFamily="34" charset="0"/>
+              </a:rPr>
+              <a:t>(</a:t>
+            </a:r>
+            <a:r>
+              <a:rPr lang="en-US" sz="1000" b="1" dirty="0" err="1">
+                <a:solidFill>
+                  <a:schemeClr val="tx1"/>
+                </a:solidFill>
+                <a:latin typeface="Arial" panose="020B0604020202020204" pitchFamily="34" charset="0"/>
+                <a:cs typeface="Arial" panose="020B0604020202020204" pitchFamily="34" charset="0"/>
+              </a:rPr>
+              <a:t>el_image</a:t>
+            </a:r>
+            <a:r>
+              <a:rPr lang="en-US" sz="1000" b="1" dirty="0">
+                <a:solidFill>
+                  <a:schemeClr val="tx1"/>
+                </a:solidFill>
+                <a:latin typeface="Arial" panose="020B0604020202020204" pitchFamily="34" charset="0"/>
+                <a:cs typeface="Arial" panose="020B0604020202020204" pitchFamily="34" charset="0"/>
+              </a:rPr>
+              <a:t>, </a:t>
+            </a:r>
+            <a:r>
+              <a:rPr lang="en-US" sz="1000" b="1" dirty="0" err="1">
+                <a:solidFill>
+                  <a:schemeClr val="tx1"/>
+                </a:solidFill>
+                <a:latin typeface="Arial" panose="020B0604020202020204" pitchFamily="34" charset="0"/>
+                <a:cs typeface="Arial" panose="020B0604020202020204" pitchFamily="34" charset="0"/>
+              </a:rPr>
+              <a:t>el_image</a:t>
+            </a:r>
+            <a:r>
+              <a:rPr lang="en-US" sz="1000" b="1" dirty="0">
+                <a:solidFill>
+                  <a:schemeClr val="tx1"/>
+                </a:solidFill>
+                <a:latin typeface="Arial" panose="020B0604020202020204" pitchFamily="34" charset="0"/>
+                <a:cs typeface="Arial" panose="020B0604020202020204" pitchFamily="34" charset="0"/>
+              </a:rPr>
+              <a:t>, </a:t>
+            </a:r>
+            <a:r>
+              <a:rPr lang="en-US" sz="1000" b="1" dirty="0" err="1">
+                <a:solidFill>
+                  <a:schemeClr val="tx1"/>
+                </a:solidFill>
+                <a:latin typeface="Arial" panose="020B0604020202020204" pitchFamily="34" charset="0"/>
+                <a:cs typeface="Arial" panose="020B0604020202020204" pitchFamily="34" charset="0"/>
+              </a:rPr>
+              <a:t>i_el_div</a:t>
+            </a:r>
+            <a:r>
+              <a:rPr lang="en-US" sz="1000" b="1" dirty="0">
+                <a:solidFill>
+                  <a:schemeClr val="tx1"/>
+                </a:solidFill>
+                <a:latin typeface="Arial" panose="020B0604020202020204" pitchFamily="34" charset="0"/>
+                <a:cs typeface="Arial" panose="020B0604020202020204" pitchFamily="34" charset="0"/>
+              </a:rPr>
+              <a:t>); </a:t>
+            </a:r>
+          </a:p>
+          <a:p>
+            <a:r>
+              <a:rPr lang="en-US" sz="1000" b="1" dirty="0">
+                <a:solidFill>
+                  <a:schemeClr val="tx1"/>
+                </a:solidFill>
+                <a:latin typeface="Arial" panose="020B0604020202020204" pitchFamily="34" charset="0"/>
+                <a:cs typeface="Arial" panose="020B0604020202020204" pitchFamily="34" charset="0"/>
+              </a:rPr>
+              <a:t>     };</a:t>
+            </a:r>
+          </a:p>
+          <a:p>
+            <a:endParaRPr lang="en-US" sz="200" b="1" dirty="0">
+              <a:solidFill>
+                <a:schemeClr val="tx1"/>
+              </a:solidFill>
+              <a:latin typeface="Arial" panose="020B0604020202020204" pitchFamily="34" charset="0"/>
+              <a:cs typeface="Arial" panose="020B0604020202020204" pitchFamily="34" charset="0"/>
+            </a:endParaRPr>
+          </a:p>
+          <a:p>
+            <a:r>
+              <a:rPr lang="en-US" sz="1000" b="1" dirty="0">
+                <a:solidFill>
+                  <a:schemeClr val="tx1"/>
+                </a:solidFill>
+                <a:latin typeface="Arial" panose="020B0604020202020204" pitchFamily="34" charset="0"/>
+                <a:cs typeface="Arial" panose="020B0604020202020204" pitchFamily="34" charset="0"/>
+              </a:rPr>
+              <a:t>    </a:t>
+            </a:r>
+            <a:r>
+              <a:rPr lang="en-US" sz="1000" b="1" dirty="0" err="1">
+                <a:solidFill>
+                  <a:schemeClr val="tx1"/>
+                </a:solidFill>
+                <a:latin typeface="Arial" panose="020B0604020202020204" pitchFamily="34" charset="0"/>
+                <a:cs typeface="Arial" panose="020B0604020202020204" pitchFamily="34" charset="0"/>
+              </a:rPr>
+              <a:t>el_image.addEventListener</a:t>
             </a:r>
             <a:endParaRPr lang="en-US" sz="1000" b="1" dirty="0">
               <a:solidFill>
@@ -5634,7 +5750,7 @@
                 <a:latin typeface="Arial" panose="020B0604020202020204" pitchFamily="34" charset="0"/>
                 <a:cs typeface="Arial" panose="020B0604020202020204" pitchFamily="34" charset="0"/>
               </a:rPr>
-              <a:t>                                 (</a:t>
+              <a:t>           ('error', </a:t>
             </a:r>
             <a:r>
               <a:rPr lang="en-US" sz="1000" b="1" dirty="0" err="1">
@@ -5644,7 +5760,7 @@
                 <a:latin typeface="Arial" panose="020B0604020202020204" pitchFamily="34" charset="0"/>
                 <a:cs typeface="Arial" panose="020B0604020202020204" pitchFamily="34" charset="0"/>
               </a:rPr>
-              <a:t>el_image</a:t>
+              <a:t>UtilImage.callbackImageNotFound</a:t>
             </a:r>
             <a:r>
               <a:rPr lang="en-US" sz="1000" b="1" dirty="0">
@@ -5654,59 +5770,7 @@
                 <a:latin typeface="Arial" panose="020B0604020202020204" pitchFamily="34" charset="0"/>
                 <a:cs typeface="Arial" panose="020B0604020202020204" pitchFamily="34" charset="0"/>
               </a:rPr>
-              <a:t>, </a:t>
-            </a:r>
-            <a:r>
-              <a:rPr lang="en-US" sz="1000" b="1" dirty="0" err="1">
-                <a:solidFill>
-                  <a:schemeClr val="tx1"/>
-                </a:solidFill>
-                <a:latin typeface="Arial" panose="020B0604020202020204" pitchFamily="34" charset="0"/>
-                <a:cs typeface="Arial" panose="020B0604020202020204" pitchFamily="34" charset="0"/>
-              </a:rPr>
-              <a:t>el_image</a:t>
-            </a:r>
-            <a:r>
-              <a:rPr lang="en-US" sz="1000" b="1" dirty="0">
-                <a:solidFill>
-                  <a:schemeClr val="tx1"/>
-                </a:solidFill>
-                <a:latin typeface="Arial" panose="020B0604020202020204" pitchFamily="34" charset="0"/>
-                <a:cs typeface="Arial" panose="020B0604020202020204" pitchFamily="34" charset="0"/>
-              </a:rPr>
-              <a:t>, </a:t>
-            </a:r>
-            <a:r>
-              <a:rPr lang="en-US" sz="1000" b="1" dirty="0" err="1">
-                <a:solidFill>
-                  <a:schemeClr val="tx1"/>
-                </a:solidFill>
-                <a:latin typeface="Arial" panose="020B0604020202020204" pitchFamily="34" charset="0"/>
-                <a:cs typeface="Arial" panose="020B0604020202020204" pitchFamily="34" charset="0"/>
-              </a:rPr>
-              <a:t>i_el_div</a:t>
-            </a:r>
-            <a:r>
-              <a:rPr lang="en-US" sz="1000" b="1" dirty="0">
-                <a:solidFill>
-                  <a:schemeClr val="tx1"/>
-                </a:solidFill>
-                <a:latin typeface="Arial" panose="020B0604020202020204" pitchFamily="34" charset="0"/>
-                <a:cs typeface="Arial" panose="020B0604020202020204" pitchFamily="34" charset="0"/>
-              </a:rPr>
-              <a:t>); </a:t>
-            </a:r>
-          </a:p>
-          <a:p>
-            <a:r>
-              <a:rPr lang="en-US" sz="1000" b="1" dirty="0">
-                <a:solidFill>
-                  <a:schemeClr val="tx1"/>
-                </a:solidFill>
-                <a:latin typeface="Arial" panose="020B0604020202020204" pitchFamily="34" charset="0"/>
-                <a:cs typeface="Arial" panose="020B0604020202020204" pitchFamily="34" charset="0"/>
-              </a:rPr>
-              <a:t>     };</a:t>
+              <a:t>);</a:t>
             </a:r>
           </a:p>
           <a:p>
@@ -5737,67 +5801,6 @@
                 <a:latin typeface="Arial" panose="020B0604020202020204" pitchFamily="34" charset="0"/>
                 <a:cs typeface="Arial" panose="020B0604020202020204" pitchFamily="34" charset="0"/>
               </a:rPr>
-              <a:t>el_image.addEventListener</a:t>
-            </a:r>
-            <a:r>
-              <a:rPr lang="en-US" sz="1000" b="1" dirty="0">
-                <a:solidFill>
-                  <a:schemeClr val="tx1"/>
-                </a:solidFill>
-                <a:latin typeface="Arial" panose="020B0604020202020204" pitchFamily="34" charset="0"/>
-                <a:cs typeface="Arial" panose="020B0604020202020204" pitchFamily="34" charset="0"/>
-              </a:rPr>
-              <a:t>('error', </a:t>
-            </a:r>
-            <a:r>
-              <a:rPr lang="en-US" sz="1000" b="1" dirty="0" err="1">
-                <a:solidFill>
-                  <a:schemeClr val="tx1"/>
-                </a:solidFill>
-                <a:latin typeface="Arial" panose="020B0604020202020204" pitchFamily="34" charset="0"/>
-                <a:cs typeface="Arial" panose="020B0604020202020204" pitchFamily="34" charset="0"/>
-              </a:rPr>
-              <a:t>UtilImage.imageNotFound</a:t>
-            </a:r>
-            <a:r>
-              <a:rPr lang="en-US" sz="1000" b="1" dirty="0">
-                <a:solidFill>
-                  <a:schemeClr val="tx1"/>
-                </a:solidFill>
-                <a:latin typeface="Arial" panose="020B0604020202020204" pitchFamily="34" charset="0"/>
-                <a:cs typeface="Arial" panose="020B0604020202020204" pitchFamily="34" charset="0"/>
-              </a:rPr>
-              <a:t>);</a:t>
-            </a:r>
-          </a:p>
-          <a:p>
-            <a:endParaRPr lang="en-US" sz="200" b="1" dirty="0">
-              <a:solidFill>
-                <a:schemeClr val="tx1"/>
-              </a:solidFill>
-              <a:latin typeface="Arial" panose="020B0604020202020204" pitchFamily="34" charset="0"/>
-              <a:cs typeface="Arial" panose="020B0604020202020204" pitchFamily="34" charset="0"/>
-            </a:endParaRPr>
-          </a:p>
-          <a:p>
-            <a:r>
-              <a:rPr lang="en-US" sz="1000" b="1" dirty="0">
-                <a:solidFill>
-                  <a:schemeClr val="tx1"/>
-                </a:solidFill>
-                <a:latin typeface="Arial" panose="020B0604020202020204" pitchFamily="34" charset="0"/>
-                <a:cs typeface="Arial" panose="020B0604020202020204" pitchFamily="34" charset="0"/>
-              </a:rPr>
-              <a:t>    </a:t>
-            </a:r>
-            <a:r>
-              <a:rPr lang="en-US" sz="1000" b="1" dirty="0" err="1">
-                <a:solidFill>
-                  <a:schemeClr val="tx1"/>
-                </a:solidFill>
-                <a:latin typeface="Arial" panose="020B0604020202020204" pitchFamily="34" charset="0"/>
-                <a:cs typeface="Arial" panose="020B0604020202020204" pitchFamily="34" charset="0"/>
-              </a:rPr>
               <a:t>el_image.src</a:t>
             </a:r>
             <a:r>
@@ -5883,7 +5886,7 @@
                 <a:latin typeface="Arial" panose="020B0604020202020204" pitchFamily="34" charset="0"/>
                 <a:cs typeface="Arial" panose="020B0604020202020204" pitchFamily="34" charset="0"/>
               </a:rPr>
-              <a:t>replaceImageInDivContainerAfterLoad</a:t>
+              <a:t>callbackAfterLoad</a:t>
             </a:r>
             <a:r>
               <a:rPr lang="en-US" sz="1000" b="1" dirty="0">
@@ -5987,18 +5990,10 @@
                 <a:latin typeface="Arial" panose="020B0604020202020204" pitchFamily="34" charset="0"/>
                 <a:cs typeface="Arial" panose="020B0604020202020204" pitchFamily="34" charset="0"/>
               </a:rPr>
-              <a:t>Calculates height. </a:t>
-            </a:r>
-            <a:r>
-              <a:rPr lang="en-US" sz="1000" i="1" dirty="0" err="1">
-                <a:solidFill>
-                  <a:schemeClr val="tx1"/>
-                </a:solidFill>
-                <a:latin typeface="Arial" panose="020B0604020202020204" pitchFamily="34" charset="0"/>
-                <a:cs typeface="Arial" panose="020B0604020202020204" pitchFamily="34" charset="0"/>
-              </a:rPr>
-              <a:t>widht</a:t>
-            </a:r>
+              <a:t>Calculates height. width for the new image </a:t>
+            </a:r>
+          </a:p>
+          <a:p>
             <a:r>
               <a:rPr lang="en-US" sz="1000" i="1" dirty="0">
                 <a:solidFill>
@@ -6007,18 +6002,6 @@
                 <a:latin typeface="Arial" panose="020B0604020202020204" pitchFamily="34" charset="0"/>
                 <a:cs typeface="Arial" panose="020B0604020202020204" pitchFamily="34" charset="0"/>
               </a:rPr>
-              <a:t> an position of the image </a:t>
-            </a:r>
-          </a:p>
-          <a:p>
-            <a:r>
-              <a:rPr lang="en-US" sz="1000" i="1" dirty="0">
-                <a:solidFill>
-                  <a:schemeClr val="tx1"/>
-                </a:solidFill>
-                <a:latin typeface="Arial" panose="020B0604020202020204" pitchFamily="34" charset="0"/>
-                <a:cs typeface="Arial" panose="020B0604020202020204" pitchFamily="34" charset="0"/>
-              </a:rPr>
               <a:t>    // Callis </a:t>
             </a:r>
             <a:r>
@@ -6030,46 +6013,6 @@
                 <a:cs typeface="Arial" panose="020B0604020202020204" pitchFamily="34" charset="0"/>
               </a:rPr>
               <a:t>getFitImageToDivScaleFactor</a:t>
-            </a:r>
-            <a:r>
-              <a:rPr lang="en-US" sz="1000" b="1" dirty="0">
-                <a:solidFill>
-                  <a:schemeClr val="tx1"/>
-                </a:solidFill>
-                <a:latin typeface="Arial" panose="020B0604020202020204" pitchFamily="34" charset="0"/>
-                <a:cs typeface="Arial" panose="020B0604020202020204" pitchFamily="34" charset="0"/>
-              </a:rPr>
-              <a:t> </a:t>
-            </a:r>
-            <a:r>
-              <a:rPr lang="en-US" sz="1000" i="1" dirty="0">
-                <a:solidFill>
-                  <a:schemeClr val="tx1"/>
-                </a:solidFill>
-                <a:latin typeface="Arial" panose="020B0604020202020204" pitchFamily="34" charset="0"/>
-                <a:cs typeface="Arial" panose="020B0604020202020204" pitchFamily="34" charset="0"/>
-              </a:rPr>
-              <a:t>and</a:t>
-            </a:r>
-            <a:r>
-              <a:rPr lang="en-US" sz="1000" b="1" dirty="0">
-                <a:solidFill>
-                  <a:schemeClr val="tx1"/>
-                </a:solidFill>
-                <a:latin typeface="Arial" panose="020B0604020202020204" pitchFamily="34" charset="0"/>
-                <a:cs typeface="Arial" panose="020B0604020202020204" pitchFamily="34" charset="0"/>
-              </a:rPr>
-              <a:t> </a:t>
-            </a:r>
-            <a:r>
-              <a:rPr lang="en-US" sz="1000" b="1" dirty="0" err="1">
-                <a:solidFill>
-                  <a:schemeClr val="tx1"/>
-                </a:solidFill>
-                <a:latin typeface="Arial" panose="020B0604020202020204" pitchFamily="34" charset="0"/>
-                <a:cs typeface="Arial" panose="020B0604020202020204" pitchFamily="34" charset="0"/>
-              </a:rPr>
-              <a:t>centerImage</a:t>
             </a:r>
             <a:endParaRPr lang="en-US" sz="1000" b="1" dirty="0">
               <a:solidFill>
@@ -6081,6 +6024,38 @@
           </a:p>
           <a:p>
             <a:r>
+              <a:rPr lang="en-US" sz="1000" i="1" dirty="0">
+                <a:solidFill>
+                  <a:schemeClr val="tx1"/>
+                </a:solidFill>
+                <a:latin typeface="Arial" panose="020B0604020202020204" pitchFamily="34" charset="0"/>
+                <a:cs typeface="Arial" panose="020B0604020202020204" pitchFamily="34" charset="0"/>
+              </a:rPr>
+              <a:t>    // Replaces the existing with the new scaled image</a:t>
+            </a:r>
+          </a:p>
+          <a:p>
+            <a:r>
+              <a:rPr lang="en-US" sz="1000" b="1" i="1" dirty="0">
+                <a:solidFill>
+                  <a:schemeClr val="tx1"/>
+                </a:solidFill>
+                <a:latin typeface="Arial" panose="020B0604020202020204" pitchFamily="34" charset="0"/>
+                <a:cs typeface="Arial" panose="020B0604020202020204" pitchFamily="34" charset="0"/>
+              </a:rPr>
+              <a:t>    </a:t>
+            </a:r>
+            <a:r>
+              <a:rPr lang="en-US" sz="1000" i="1" dirty="0">
+                <a:solidFill>
+                  <a:schemeClr val="tx1"/>
+                </a:solidFill>
+                <a:latin typeface="Arial" panose="020B0604020202020204" pitchFamily="34" charset="0"/>
+                <a:cs typeface="Arial" panose="020B0604020202020204" pitchFamily="34" charset="0"/>
+              </a:rPr>
+              <a:t>// Centers the image. Calls</a:t>
+            </a:r>
+            <a:r>
               <a:rPr lang="en-US" sz="1000" b="1" dirty="0">
                 <a:solidFill>
                   <a:schemeClr val="tx1"/>
@@ -6088,17 +6063,17 @@
                 <a:latin typeface="Arial" panose="020B0604020202020204" pitchFamily="34" charset="0"/>
                 <a:cs typeface="Arial" panose="020B0604020202020204" pitchFamily="34" charset="0"/>
               </a:rPr>
-              <a:t>    </a:t>
-            </a:r>
-            <a:r>
-              <a:rPr lang="en-US" sz="1000" i="1" dirty="0">
-                <a:solidFill>
-                  <a:schemeClr val="tx1"/>
-                </a:solidFill>
-                <a:latin typeface="Arial" panose="020B0604020202020204" pitchFamily="34" charset="0"/>
-                <a:cs typeface="Arial" panose="020B0604020202020204" pitchFamily="34" charset="0"/>
-              </a:rPr>
-              <a:t>// Setts the calculated values</a:t>
+              <a:t> </a:t>
+            </a:r>
+            <a:r>
+              <a:rPr lang="en-US" sz="1000" b="1" dirty="0" err="1">
+                <a:solidFill>
+                  <a:schemeClr val="tx1"/>
+                </a:solidFill>
+                <a:latin typeface="Arial" panose="020B0604020202020204" pitchFamily="34" charset="0"/>
+                <a:cs typeface="Arial" panose="020B0604020202020204" pitchFamily="34" charset="0"/>
+              </a:rPr>
+              <a:t>centerImage</a:t>
             </a:r>
             <a:endParaRPr lang="en-US" sz="1000" b="1" i="1" dirty="0">
               <a:solidFill>
@@ -6151,6 +6126,16 @@
               <a:t> </a:t>
             </a:r>
             <a:r>
+              <a:rPr lang="en-US" sz="1000" b="1" i="1" dirty="0" err="1">
+                <a:solidFill>
+                  <a:schemeClr val="tx1"/>
+                </a:solidFill>
+                <a:latin typeface="Arial" panose="020B0604020202020204" pitchFamily="34" charset="0"/>
+                <a:cs typeface="Arial" panose="020B0604020202020204" pitchFamily="34" charset="0"/>
+              </a:rPr>
+              <a:t>callbackI</a:t>
+            </a:r>
+            <a:r>
               <a:rPr lang="en-US" sz="1000" b="1" dirty="0" err="1">
                 <a:solidFill>
                   <a:schemeClr val="tx1"/>
@@ -6158,7 +6143,7 @@
                 <a:latin typeface="Arial" panose="020B0604020202020204" pitchFamily="34" charset="0"/>
                 <a:cs typeface="Arial" panose="020B0604020202020204" pitchFamily="34" charset="0"/>
               </a:rPr>
-              <a:t>imageNotFound</a:t>
+              <a:t>mageNotFound</a:t>
             </a:r>
             <a:r>
               <a:rPr lang="en-US" sz="1000" b="1" dirty="0">
@@ -6172,7 +6157,7 @@
             </a:r>
           </a:p>
           <a:p>
-            <a:endParaRPr lang="en-US" sz="1000" i="1" dirty="0">
+            <a:endParaRPr lang="en-US" sz="200" i="1" dirty="0">
               <a:solidFill>
                 <a:schemeClr val="tx1"/>
               </a:solidFill>

</xml_diff>